<commit_message>
all-slides.pdf basics.pdf basics.pptx lists.pdf lists.pptx operations.pdf operations.pptx
</commit_message>
<xml_diff>
--- a/ipsa/slides/basics.pptx
+++ b/ipsa/slides/basics.pptx
@@ -135,6 +135,14 @@
 </p:presentation>
 </file>
 
+<file path=ppt/revisionInfo.xml><?xml version="1.0" encoding="utf-8"?>
+<p1510:revInfo xmlns:a="http://schemas.openxmlformats.org/drawingml/2006/main" xmlns:r="http://schemas.openxmlformats.org/officeDocument/2006/relationships" xmlns:p1510="http://schemas.microsoft.com/office/powerpoint/2015/10/main">
+  <p1510:revLst>
+    <p1510:client id="{19B2619F-AF11-406A-8620-690814C4F2A4}" v="1" dt="2025-02-03T12:08:55.569"/>
+  </p1510:revLst>
+</p1510:revInfo>
+</file>
+
 <file path=ppt/changesInfos/changesInfo1.xml><?xml version="1.0" encoding="utf-8"?>
 <pc:chgInfo xmlns:a="http://schemas.openxmlformats.org/drawingml/2006/main" xmlns:r="http://schemas.openxmlformats.org/officeDocument/2006/relationships" xmlns:ac="http://schemas.microsoft.com/office/drawing/2013/main/command" xmlns:pc="http://schemas.microsoft.com/office/powerpoint/2013/main/command">
   <pc:docChgLst>
@@ -169,8 +177,8 @@
   </pc:docChgLst>
   <pc:docChgLst>
     <pc:chgData name="Gerth Stølting Brodal" userId="04ef4784-6591-4f86-a140-f5c3b108582a" providerId="ADAL" clId="{19B2619F-AF11-406A-8620-690814C4F2A4}"/>
-    <pc:docChg chg="modSld">
-      <pc:chgData name="Gerth Stølting Brodal" userId="04ef4784-6591-4f86-a140-f5c3b108582a" providerId="ADAL" clId="{19B2619F-AF11-406A-8620-690814C4F2A4}" dt="2025-01-30T08:57:37.226" v="94" actId="20577"/>
+    <pc:docChg chg="undo redo custSel modSld">
+      <pc:chgData name="Gerth Stølting Brodal" userId="04ef4784-6591-4f86-a140-f5c3b108582a" providerId="ADAL" clId="{19B2619F-AF11-406A-8620-690814C4F2A4}" dt="2025-02-03T12:10:14.731" v="298" actId="1035"/>
       <pc:docMkLst>
         <pc:docMk/>
       </pc:docMkLst>
@@ -188,6 +196,29 @@
             <ac:spMk id="3" creationId="{00000000-0000-0000-0000-000000000000}"/>
           </ac:spMkLst>
         </pc:spChg>
+      </pc:sldChg>
+      <pc:sldChg chg="modSp mod">
+        <pc:chgData name="Gerth Stølting Brodal" userId="04ef4784-6591-4f86-a140-f5c3b108582a" providerId="ADAL" clId="{19B2619F-AF11-406A-8620-690814C4F2A4}" dt="2025-02-03T12:10:14.731" v="298" actId="1035"/>
+        <pc:sldMkLst>
+          <pc:docMk/>
+          <pc:sldMk cId="3240216432" sldId="390"/>
+        </pc:sldMkLst>
+        <pc:spChg chg="mod">
+          <ac:chgData name="Gerth Stølting Brodal" userId="04ef4784-6591-4f86-a140-f5c3b108582a" providerId="ADAL" clId="{19B2619F-AF11-406A-8620-690814C4F2A4}" dt="2025-02-03T12:10:06.055" v="278" actId="20577"/>
+          <ac:spMkLst>
+            <pc:docMk/>
+            <pc:sldMk cId="3240216432" sldId="390"/>
+            <ac:spMk id="3" creationId="{00000000-0000-0000-0000-000000000000}"/>
+          </ac:spMkLst>
+        </pc:spChg>
+        <pc:graphicFrameChg chg="mod">
+          <ac:chgData name="Gerth Stølting Brodal" userId="04ef4784-6591-4f86-a140-f5c3b108582a" providerId="ADAL" clId="{19B2619F-AF11-406A-8620-690814C4F2A4}" dt="2025-02-03T12:10:14.731" v="298" actId="1035"/>
+          <ac:graphicFrameMkLst>
+            <pc:docMk/>
+            <pc:sldMk cId="3240216432" sldId="390"/>
+            <ac:graphicFrameMk id="4" creationId="{00000000-0000-0000-0000-000000000000}"/>
+          </ac:graphicFrameMkLst>
+        </pc:graphicFrameChg>
       </pc:sldChg>
     </pc:docChg>
   </pc:docChgLst>
@@ -364,7 +395,7 @@
           <a:p>
             <a:fld id="{FB1A172F-81D4-4DC4-9113-1DBD56EC3646}" type="datetimeFigureOut">
               <a:rPr lang="en-US" smtClean="0"/>
-              <a:t>1/30/2025</a:t>
+              <a:t>2/3/2025</a:t>
             </a:fld>
             <a:endParaRPr lang="en-US"/>
           </a:p>
@@ -2681,7 +2712,7 @@
           <a:p>
             <a:fld id="{0560A9CD-0304-4E0B-9E82-E7E0115DE05B}" type="datetimeFigureOut">
               <a:rPr lang="en-US" smtClean="0"/>
-              <a:t>1/30/2025</a:t>
+              <a:t>2/3/2025</a:t>
             </a:fld>
             <a:endParaRPr lang="en-US"/>
           </a:p>
@@ -2849,7 +2880,7 @@
           <a:p>
             <a:fld id="{0560A9CD-0304-4E0B-9E82-E7E0115DE05B}" type="datetimeFigureOut">
               <a:rPr lang="en-US" smtClean="0"/>
-              <a:t>1/30/2025</a:t>
+              <a:t>2/3/2025</a:t>
             </a:fld>
             <a:endParaRPr lang="en-US"/>
           </a:p>
@@ -3027,7 +3058,7 @@
           <a:p>
             <a:fld id="{0560A9CD-0304-4E0B-9E82-E7E0115DE05B}" type="datetimeFigureOut">
               <a:rPr lang="en-US" smtClean="0"/>
-              <a:t>1/30/2025</a:t>
+              <a:t>2/3/2025</a:t>
             </a:fld>
             <a:endParaRPr lang="en-US"/>
           </a:p>
@@ -3204,7 +3235,7 @@
           <a:p>
             <a:fld id="{0560A9CD-0304-4E0B-9E82-E7E0115DE05B}" type="datetimeFigureOut">
               <a:rPr lang="en-US" smtClean="0"/>
-              <a:t>1/30/2025</a:t>
+              <a:t>2/3/2025</a:t>
             </a:fld>
             <a:endParaRPr lang="en-US"/>
           </a:p>
@@ -3449,7 +3480,7 @@
           <a:p>
             <a:fld id="{0560A9CD-0304-4E0B-9E82-E7E0115DE05B}" type="datetimeFigureOut">
               <a:rPr lang="en-US" smtClean="0"/>
-              <a:t>1/30/2025</a:t>
+              <a:t>2/3/2025</a:t>
             </a:fld>
             <a:endParaRPr lang="en-US"/>
           </a:p>
@@ -3678,7 +3709,7 @@
           <a:p>
             <a:fld id="{0560A9CD-0304-4E0B-9E82-E7E0115DE05B}" type="datetimeFigureOut">
               <a:rPr lang="en-US" smtClean="0"/>
-              <a:t>1/30/2025</a:t>
+              <a:t>2/3/2025</a:t>
             </a:fld>
             <a:endParaRPr lang="en-US"/>
           </a:p>
@@ -4042,7 +4073,7 @@
           <a:p>
             <a:fld id="{0560A9CD-0304-4E0B-9E82-E7E0115DE05B}" type="datetimeFigureOut">
               <a:rPr lang="en-US" smtClean="0"/>
-              <a:t>1/30/2025</a:t>
+              <a:t>2/3/2025</a:t>
             </a:fld>
             <a:endParaRPr lang="en-US"/>
           </a:p>
@@ -4159,7 +4190,7 @@
           <a:p>
             <a:fld id="{0560A9CD-0304-4E0B-9E82-E7E0115DE05B}" type="datetimeFigureOut">
               <a:rPr lang="en-US" smtClean="0"/>
-              <a:t>1/30/2025</a:t>
+              <a:t>2/3/2025</a:t>
             </a:fld>
             <a:endParaRPr lang="en-US"/>
           </a:p>
@@ -4254,7 +4285,7 @@
           <a:p>
             <a:fld id="{0560A9CD-0304-4E0B-9E82-E7E0115DE05B}" type="datetimeFigureOut">
               <a:rPr lang="en-US" smtClean="0"/>
-              <a:t>1/30/2025</a:t>
+              <a:t>2/3/2025</a:t>
             </a:fld>
             <a:endParaRPr lang="en-US"/>
           </a:p>
@@ -4529,7 +4560,7 @@
           <a:p>
             <a:fld id="{0560A9CD-0304-4E0B-9E82-E7E0115DE05B}" type="datetimeFigureOut">
               <a:rPr lang="en-US" smtClean="0"/>
-              <a:t>1/30/2025</a:t>
+              <a:t>2/3/2025</a:t>
             </a:fld>
             <a:endParaRPr lang="en-US"/>
           </a:p>
@@ -4781,7 +4812,7 @@
           <a:p>
             <a:fld id="{0560A9CD-0304-4E0B-9E82-E7E0115DE05B}" type="datetimeFigureOut">
               <a:rPr lang="en-US" smtClean="0"/>
-              <a:t>1/30/2025</a:t>
+              <a:t>2/3/2025</a:t>
             </a:fld>
             <a:endParaRPr lang="en-US"/>
           </a:p>
@@ -4992,7 +5023,7 @@
           <a:p>
             <a:fld id="{0560A9CD-0304-4E0B-9E82-E7E0115DE05B}" type="datetimeFigureOut">
               <a:rPr lang="en-US" smtClean="0"/>
-              <a:t>1/30/2025</a:t>
+              <a:t>2/3/2025</a:t>
             </a:fld>
             <a:endParaRPr lang="en-US"/>
           </a:p>
@@ -12486,9 +12517,16 @@
             <p:ph idx="1"/>
           </p:nvPr>
         </p:nvSpPr>
-        <p:spPr/>
+        <p:spPr>
+          <a:xfrm>
+            <a:off x="838200" y="1825624"/>
+            <a:ext cx="10515600" cy="5032375"/>
+          </a:xfrm>
+        </p:spPr>
         <p:txBody>
-          <a:bodyPr/>
+          <a:bodyPr>
+            <a:normAutofit/>
+          </a:bodyPr>
           <a:lstStyle/>
           <a:p>
             <a:r>
@@ -12537,6 +12575,42 @@
               <a:t>re</a:t>
             </a:r>
             <a:endParaRPr lang="en-US" dirty="0">
+              <a:latin typeface="Courier"/>
+            </a:endParaRPr>
+          </a:p>
+          <a:p>
+            <a:endParaRPr lang="en-US" sz="2000" dirty="0"/>
+          </a:p>
+          <a:p>
+            <a:endParaRPr lang="en-US" sz="2000" dirty="0"/>
+          </a:p>
+          <a:p>
+            <a:endParaRPr lang="en-US" sz="2000" dirty="0"/>
+          </a:p>
+          <a:p>
+            <a:endParaRPr lang="en-US" sz="2000" dirty="0"/>
+          </a:p>
+          <a:p>
+            <a:endParaRPr lang="en-US" sz="2000" dirty="0"/>
+          </a:p>
+          <a:p>
+            <a:endParaRPr lang="en-US" sz="2000" dirty="0"/>
+          </a:p>
+          <a:p>
+            <a:endParaRPr lang="en-US" sz="2000" dirty="0"/>
+          </a:p>
+          <a:p>
+            <a:r>
+              <a:rPr lang="en-US" sz="2000" dirty="0"/>
+              <a:t>Strange exception:  </a:t>
+            </a:r>
+            <a:r>
+              <a:rPr lang="en-US" sz="2000" dirty="0">
+                <a:hlinkClick r:id="rId3"/>
+              </a:rPr>
+              <a:t>A raw string cannot end with an odd number of backslashes</a:t>
+            </a:r>
+            <a:endParaRPr lang="en-US" sz="2000" dirty="0">
               <a:latin typeface="Courier"/>
             </a:endParaRPr>
           </a:p>
@@ -12551,13 +12625,13 @@
           <p:nvPr>
             <p:extLst>
               <p:ext uri="{D42A27DB-BD31-4B8C-83A1-F6EECF244321}">
-                <p14:modId xmlns:p14="http://schemas.microsoft.com/office/powerpoint/2010/main" val="2469380164"/>
+                <p14:modId xmlns:p14="http://schemas.microsoft.com/office/powerpoint/2010/main" val="3426932090"/>
               </p:ext>
             </p:extLst>
           </p:nvPr>
         </p:nvGraphicFramePr>
         <p:xfrm>
-          <a:off x="1961146" y="4001294"/>
+          <a:off x="1961146" y="3810222"/>
           <a:ext cx="8231505" cy="2377440"/>
         </p:xfrm>
         <a:graphic>

</xml_diff>

<commit_message>
all_slides.pdf all_slides_with_answers.pdf basics.pdf basics.pptx control.pdf control.pptx dictionaries.pdf dictionaries.pptx functions.pdf functions.pptx lists.pdf lists.pptx operations.pdf operations.pptx recursion.pdf recursion.pptx recursion_iteration.pdf recursion_iteration.pptx tuple.pdf tuple.pptx
</commit_message>
<xml_diff>
--- a/ipsa/slides/basics.pptx
+++ b/ipsa/slides/basics.pptx
@@ -135,14 +135,6 @@
 </p:presentation>
 </file>
 
-<file path=ppt/revisionInfo.xml><?xml version="1.0" encoding="utf-8"?>
-<p1510:revInfo xmlns:a="http://schemas.openxmlformats.org/drawingml/2006/main" xmlns:r="http://schemas.openxmlformats.org/officeDocument/2006/relationships" xmlns:p1510="http://schemas.microsoft.com/office/powerpoint/2015/10/main">
-  <p1510:revLst>
-    <p1510:client id="{19B2619F-AF11-406A-8620-690814C4F2A4}" v="1" dt="2025-02-03T12:08:55.569"/>
-  </p1510:revLst>
-</p1510:revInfo>
-</file>
-
 <file path=ppt/changesInfos/changesInfo1.xml><?xml version="1.0" encoding="utf-8"?>
 <pc:chgInfo xmlns:a="http://schemas.openxmlformats.org/drawingml/2006/main" xmlns:r="http://schemas.openxmlformats.org/officeDocument/2006/relationships" xmlns:ac="http://schemas.microsoft.com/office/drawing/2013/main/command" xmlns:pc="http://schemas.microsoft.com/office/powerpoint/2013/main/command">
   <pc:docChgLst>
@@ -188,14 +180,6 @@
           <pc:docMk/>
           <pc:sldMk cId="48303750" sldId="357"/>
         </pc:sldMkLst>
-        <pc:spChg chg="mod">
-          <ac:chgData name="Gerth Stølting Brodal" userId="04ef4784-6591-4f86-a140-f5c3b108582a" providerId="ADAL" clId="{19B2619F-AF11-406A-8620-690814C4F2A4}" dt="2025-01-30T08:57:37.226" v="94" actId="20577"/>
-          <ac:spMkLst>
-            <pc:docMk/>
-            <pc:sldMk cId="48303750" sldId="357"/>
-            <ac:spMk id="3" creationId="{00000000-0000-0000-0000-000000000000}"/>
-          </ac:spMkLst>
-        </pc:spChg>
       </pc:sldChg>
       <pc:sldChg chg="modSp mod">
         <pc:chgData name="Gerth Stølting Brodal" userId="04ef4784-6591-4f86-a140-f5c3b108582a" providerId="ADAL" clId="{19B2619F-AF11-406A-8620-690814C4F2A4}" dt="2025-02-03T12:10:14.731" v="298" actId="1035"/>
@@ -203,22 +187,138 @@
           <pc:docMk/>
           <pc:sldMk cId="3240216432" sldId="390"/>
         </pc:sldMkLst>
+      </pc:sldChg>
+    </pc:docChg>
+  </pc:docChgLst>
+  <pc:docChgLst>
+    <pc:chgData name="Gerth Stølting Brodal" userId="04ef4784-6591-4f86-a140-f5c3b108582a" providerId="ADAL" clId="{27124F44-A0F7-408A-AA2B-2C5136C1DC06}"/>
+    <pc:docChg chg="undo custSel modSld">
+      <pc:chgData name="Gerth Stølting Brodal" userId="04ef4784-6591-4f86-a140-f5c3b108582a" providerId="ADAL" clId="{27124F44-A0F7-408A-AA2B-2C5136C1DC06}" dt="2025-10-27T18:12:08.875" v="71" actId="962"/>
+      <pc:docMkLst>
+        <pc:docMk/>
+      </pc:docMkLst>
+      <pc:sldChg chg="modSp mod">
+        <pc:chgData name="Gerth Stølting Brodal" userId="04ef4784-6591-4f86-a140-f5c3b108582a" providerId="ADAL" clId="{27124F44-A0F7-408A-AA2B-2C5136C1DC06}" dt="2025-10-27T18:11:13.644" v="57" actId="962"/>
+        <pc:sldMkLst>
+          <pc:docMk/>
+          <pc:sldMk cId="1252763104" sldId="358"/>
+        </pc:sldMkLst>
         <pc:spChg chg="mod">
-          <ac:chgData name="Gerth Stølting Brodal" userId="04ef4784-6591-4f86-a140-f5c3b108582a" providerId="ADAL" clId="{19B2619F-AF11-406A-8620-690814C4F2A4}" dt="2025-02-03T12:10:06.055" v="278" actId="20577"/>
+          <ac:chgData name="Gerth Stølting Brodal" userId="04ef4784-6591-4f86-a140-f5c3b108582a" providerId="ADAL" clId="{27124F44-A0F7-408A-AA2B-2C5136C1DC06}" dt="2025-10-27T18:11:13.644" v="57" actId="962"/>
           <ac:spMkLst>
             <pc:docMk/>
-            <pc:sldMk cId="3240216432" sldId="390"/>
-            <ac:spMk id="3" creationId="{00000000-0000-0000-0000-000000000000}"/>
+            <pc:sldMk cId="1252763104" sldId="358"/>
+            <ac:spMk id="4" creationId="{00000000-0000-0000-0000-000000000000}"/>
+          </ac:spMkLst>
+        </pc:spChg>
+        <pc:spChg chg="mod">
+          <ac:chgData name="Gerth Stølting Brodal" userId="04ef4784-6591-4f86-a140-f5c3b108582a" providerId="ADAL" clId="{27124F44-A0F7-408A-AA2B-2C5136C1DC06}" dt="2025-10-27T18:10:42.397" v="23" actId="962"/>
+          <ac:spMkLst>
+            <pc:docMk/>
+            <pc:sldMk cId="1252763104" sldId="358"/>
+            <ac:spMk id="8" creationId="{00000000-0000-0000-0000-000000000000}"/>
           </ac:spMkLst>
         </pc:spChg>
         <pc:graphicFrameChg chg="mod">
-          <ac:chgData name="Gerth Stølting Brodal" userId="04ef4784-6591-4f86-a140-f5c3b108582a" providerId="ADAL" clId="{19B2619F-AF11-406A-8620-690814C4F2A4}" dt="2025-02-03T12:10:14.731" v="298" actId="1035"/>
+          <ac:chgData name="Gerth Stølting Brodal" userId="04ef4784-6591-4f86-a140-f5c3b108582a" providerId="ADAL" clId="{27124F44-A0F7-408A-AA2B-2C5136C1DC06}" dt="2025-10-27T18:11:05.569" v="51" actId="962"/>
           <ac:graphicFrameMkLst>
             <pc:docMk/>
-            <pc:sldMk cId="3240216432" sldId="390"/>
-            <ac:graphicFrameMk id="4" creationId="{00000000-0000-0000-0000-000000000000}"/>
+            <pc:sldMk cId="1252763104" sldId="358"/>
+            <ac:graphicFrameMk id="10" creationId="{00000000-0000-0000-0000-000000000000}"/>
           </ac:graphicFrameMkLst>
         </pc:graphicFrameChg>
+        <pc:picChg chg="mod">
+          <ac:chgData name="Gerth Stølting Brodal" userId="04ef4784-6591-4f86-a140-f5c3b108582a" providerId="ADAL" clId="{27124F44-A0F7-408A-AA2B-2C5136C1DC06}" dt="2025-10-27T18:11:09.952" v="55" actId="962"/>
+          <ac:picMkLst>
+            <pc:docMk/>
+            <pc:sldMk cId="1252763104" sldId="358"/>
+            <ac:picMk id="9" creationId="{00000000-0000-0000-0000-000000000000}"/>
+          </ac:picMkLst>
+        </pc:picChg>
+      </pc:sldChg>
+      <pc:sldChg chg="modSp mod">
+        <pc:chgData name="Gerth Stølting Brodal" userId="04ef4784-6591-4f86-a140-f5c3b108582a" providerId="ADAL" clId="{27124F44-A0F7-408A-AA2B-2C5136C1DC06}" dt="2025-10-27T18:11:33.021" v="59" actId="962"/>
+        <pc:sldMkLst>
+          <pc:docMk/>
+          <pc:sldMk cId="1651364254" sldId="364"/>
+        </pc:sldMkLst>
+        <pc:spChg chg="mod">
+          <ac:chgData name="Gerth Stølting Brodal" userId="04ef4784-6591-4f86-a140-f5c3b108582a" providerId="ADAL" clId="{27124F44-A0F7-408A-AA2B-2C5136C1DC06}" dt="2025-10-27T18:11:33.021" v="59" actId="962"/>
+          <ac:spMkLst>
+            <pc:docMk/>
+            <pc:sldMk cId="1651364254" sldId="364"/>
+            <ac:spMk id="4" creationId="{00000000-0000-0000-0000-000000000000}"/>
+          </ac:spMkLst>
+        </pc:spChg>
+      </pc:sldChg>
+      <pc:sldChg chg="modSp mod">
+        <pc:chgData name="Gerth Stølting Brodal" userId="04ef4784-6591-4f86-a140-f5c3b108582a" providerId="ADAL" clId="{27124F44-A0F7-408A-AA2B-2C5136C1DC06}" dt="2025-10-27T18:11:51.980" v="67" actId="962"/>
+        <pc:sldMkLst>
+          <pc:docMk/>
+          <pc:sldMk cId="3279644778" sldId="366"/>
+        </pc:sldMkLst>
+        <pc:spChg chg="mod">
+          <ac:chgData name="Gerth Stølting Brodal" userId="04ef4784-6591-4f86-a140-f5c3b108582a" providerId="ADAL" clId="{27124F44-A0F7-408A-AA2B-2C5136C1DC06}" dt="2025-10-27T18:11:43.176" v="61" actId="962"/>
+          <ac:spMkLst>
+            <pc:docMk/>
+            <pc:sldMk cId="3279644778" sldId="366"/>
+            <ac:spMk id="4" creationId="{00000000-0000-0000-0000-000000000000}"/>
+          </ac:spMkLst>
+        </pc:spChg>
+        <pc:spChg chg="mod">
+          <ac:chgData name="Gerth Stølting Brodal" userId="04ef4784-6591-4f86-a140-f5c3b108582a" providerId="ADAL" clId="{27124F44-A0F7-408A-AA2B-2C5136C1DC06}" dt="2025-10-27T18:11:51.980" v="67" actId="962"/>
+          <ac:spMkLst>
+            <pc:docMk/>
+            <pc:sldMk cId="3279644778" sldId="366"/>
+            <ac:spMk id="7" creationId="{00000000-0000-0000-0000-000000000000}"/>
+          </ac:spMkLst>
+        </pc:spChg>
+        <pc:graphicFrameChg chg="mod">
+          <ac:chgData name="Gerth Stølting Brodal" userId="04ef4784-6591-4f86-a140-f5c3b108582a" providerId="ADAL" clId="{27124F44-A0F7-408A-AA2B-2C5136C1DC06}" dt="2025-10-27T18:11:49.335" v="65" actId="962"/>
+          <ac:graphicFrameMkLst>
+            <pc:docMk/>
+            <pc:sldMk cId="3279644778" sldId="366"/>
+            <ac:graphicFrameMk id="5" creationId="{00000000-0000-0000-0000-000000000000}"/>
+          </ac:graphicFrameMkLst>
+        </pc:graphicFrameChg>
+        <pc:picChg chg="mod">
+          <ac:chgData name="Gerth Stølting Brodal" userId="04ef4784-6591-4f86-a140-f5c3b108582a" providerId="ADAL" clId="{27124F44-A0F7-408A-AA2B-2C5136C1DC06}" dt="2025-10-27T18:11:46.224" v="63" actId="962"/>
+          <ac:picMkLst>
+            <pc:docMk/>
+            <pc:sldMk cId="3279644778" sldId="366"/>
+            <ac:picMk id="6" creationId="{00000000-0000-0000-0000-000000000000}"/>
+          </ac:picMkLst>
+        </pc:picChg>
+      </pc:sldChg>
+      <pc:sldChg chg="modSp mod">
+        <pc:chgData name="Gerth Stølting Brodal" userId="04ef4784-6591-4f86-a140-f5c3b108582a" providerId="ADAL" clId="{27124F44-A0F7-408A-AA2B-2C5136C1DC06}" dt="2025-10-27T18:12:00.161" v="69" actId="962"/>
+        <pc:sldMkLst>
+          <pc:docMk/>
+          <pc:sldMk cId="2955211567" sldId="369"/>
+        </pc:sldMkLst>
+        <pc:spChg chg="mod">
+          <ac:chgData name="Gerth Stølting Brodal" userId="04ef4784-6591-4f86-a140-f5c3b108582a" providerId="ADAL" clId="{27124F44-A0F7-408A-AA2B-2C5136C1DC06}" dt="2025-10-27T18:12:00.161" v="69" actId="962"/>
+          <ac:spMkLst>
+            <pc:docMk/>
+            <pc:sldMk cId="2955211567" sldId="369"/>
+            <ac:spMk id="4" creationId="{00000000-0000-0000-0000-000000000000}"/>
+          </ac:spMkLst>
+        </pc:spChg>
+      </pc:sldChg>
+      <pc:sldChg chg="modSp mod">
+        <pc:chgData name="Gerth Stølting Brodal" userId="04ef4784-6591-4f86-a140-f5c3b108582a" providerId="ADAL" clId="{27124F44-A0F7-408A-AA2B-2C5136C1DC06}" dt="2025-10-27T18:12:08.875" v="71" actId="962"/>
+        <pc:sldMkLst>
+          <pc:docMk/>
+          <pc:sldMk cId="4156421730" sldId="387"/>
+        </pc:sldMkLst>
+        <pc:spChg chg="mod">
+          <ac:chgData name="Gerth Stølting Brodal" userId="04ef4784-6591-4f86-a140-f5c3b108582a" providerId="ADAL" clId="{27124F44-A0F7-408A-AA2B-2C5136C1DC06}" dt="2025-10-27T18:12:08.875" v="71" actId="962"/>
+          <ac:spMkLst>
+            <pc:docMk/>
+            <pc:sldMk cId="4156421730" sldId="387"/>
+            <ac:spMk id="5" creationId="{00000000-0000-0000-0000-000000000000}"/>
+          </ac:spMkLst>
+        </pc:spChg>
       </pc:sldChg>
     </pc:docChg>
   </pc:docChgLst>
@@ -395,7 +495,7 @@
           <a:p>
             <a:fld id="{FB1A172F-81D4-4DC4-9113-1DBD56EC3646}" type="datetimeFigureOut">
               <a:rPr lang="en-US" smtClean="0"/>
-              <a:t>2/3/2025</a:t>
+              <a:t>10/27/2025</a:t>
             </a:fld>
             <a:endParaRPr lang="en-US"/>
           </a:p>
@@ -2712,7 +2812,7 @@
           <a:p>
             <a:fld id="{0560A9CD-0304-4E0B-9E82-E7E0115DE05B}" type="datetimeFigureOut">
               <a:rPr lang="en-US" smtClean="0"/>
-              <a:t>2/3/2025</a:t>
+              <a:t>10/27/2025</a:t>
             </a:fld>
             <a:endParaRPr lang="en-US"/>
           </a:p>
@@ -2880,7 +2980,7 @@
           <a:p>
             <a:fld id="{0560A9CD-0304-4E0B-9E82-E7E0115DE05B}" type="datetimeFigureOut">
               <a:rPr lang="en-US" smtClean="0"/>
-              <a:t>2/3/2025</a:t>
+              <a:t>10/27/2025</a:t>
             </a:fld>
             <a:endParaRPr lang="en-US"/>
           </a:p>
@@ -3058,7 +3158,7 @@
           <a:p>
             <a:fld id="{0560A9CD-0304-4E0B-9E82-E7E0115DE05B}" type="datetimeFigureOut">
               <a:rPr lang="en-US" smtClean="0"/>
-              <a:t>2/3/2025</a:t>
+              <a:t>10/27/2025</a:t>
             </a:fld>
             <a:endParaRPr lang="en-US"/>
           </a:p>
@@ -3235,7 +3335,7 @@
           <a:p>
             <a:fld id="{0560A9CD-0304-4E0B-9E82-E7E0115DE05B}" type="datetimeFigureOut">
               <a:rPr lang="en-US" smtClean="0"/>
-              <a:t>2/3/2025</a:t>
+              <a:t>10/27/2025</a:t>
             </a:fld>
             <a:endParaRPr lang="en-US"/>
           </a:p>
@@ -3480,7 +3580,7 @@
           <a:p>
             <a:fld id="{0560A9CD-0304-4E0B-9E82-E7E0115DE05B}" type="datetimeFigureOut">
               <a:rPr lang="en-US" smtClean="0"/>
-              <a:t>2/3/2025</a:t>
+              <a:t>10/27/2025</a:t>
             </a:fld>
             <a:endParaRPr lang="en-US"/>
           </a:p>
@@ -3709,7 +3809,7 @@
           <a:p>
             <a:fld id="{0560A9CD-0304-4E0B-9E82-E7E0115DE05B}" type="datetimeFigureOut">
               <a:rPr lang="en-US" smtClean="0"/>
-              <a:t>2/3/2025</a:t>
+              <a:t>10/27/2025</a:t>
             </a:fld>
             <a:endParaRPr lang="en-US"/>
           </a:p>
@@ -4073,7 +4173,7 @@
           <a:p>
             <a:fld id="{0560A9CD-0304-4E0B-9E82-E7E0115DE05B}" type="datetimeFigureOut">
               <a:rPr lang="en-US" smtClean="0"/>
-              <a:t>2/3/2025</a:t>
+              <a:t>10/27/2025</a:t>
             </a:fld>
             <a:endParaRPr lang="en-US"/>
           </a:p>
@@ -4190,7 +4290,7 @@
           <a:p>
             <a:fld id="{0560A9CD-0304-4E0B-9E82-E7E0115DE05B}" type="datetimeFigureOut">
               <a:rPr lang="en-US" smtClean="0"/>
-              <a:t>2/3/2025</a:t>
+              <a:t>10/27/2025</a:t>
             </a:fld>
             <a:endParaRPr lang="en-US"/>
           </a:p>
@@ -4285,7 +4385,7 @@
           <a:p>
             <a:fld id="{0560A9CD-0304-4E0B-9E82-E7E0115DE05B}" type="datetimeFigureOut">
               <a:rPr lang="en-US" smtClean="0"/>
-              <a:t>2/3/2025</a:t>
+              <a:t>10/27/2025</a:t>
             </a:fld>
             <a:endParaRPr lang="en-US"/>
           </a:p>
@@ -4560,7 +4660,7 @@
           <a:p>
             <a:fld id="{0560A9CD-0304-4E0B-9E82-E7E0115DE05B}" type="datetimeFigureOut">
               <a:rPr lang="en-US" smtClean="0"/>
-              <a:t>2/3/2025</a:t>
+              <a:t>10/27/2025</a:t>
             </a:fld>
             <a:endParaRPr lang="en-US"/>
           </a:p>
@@ -4812,7 +4912,7 @@
           <a:p>
             <a:fld id="{0560A9CD-0304-4E0B-9E82-E7E0115DE05B}" type="datetimeFigureOut">
               <a:rPr lang="en-US" smtClean="0"/>
-              <a:t>2/3/2025</a:t>
+              <a:t>10/27/2025</a:t>
             </a:fld>
             <a:endParaRPr lang="en-US"/>
           </a:p>
@@ -5023,7 +5123,7 @@
           <a:p>
             <a:fld id="{0560A9CD-0304-4E0B-9E82-E7E0115DE05B}" type="datetimeFigureOut">
               <a:rPr lang="en-US" smtClean="0"/>
-              <a:t>2/3/2025</a:t>
+              <a:t>10/27/2025</a:t>
             </a:fld>
             <a:endParaRPr lang="en-US"/>
           </a:p>
@@ -11312,7 +11412,7 @@
       </p:sp>
       <p:sp>
         <p:nvSpPr>
-          <p:cNvPr id="4" name="Smiley Face 3"/>
+          <p:cNvPr id="4" name="Smiley Face 3" descr="QuizAnswer"/>
           <p:cNvSpPr/>
           <p:nvPr/>
         </p:nvSpPr>
@@ -16967,7 +17067,7 @@
       </p:sp>
       <p:sp>
         <p:nvSpPr>
-          <p:cNvPr id="5" name="Smiley Face 4"/>
+          <p:cNvPr id="5" name="Smiley Face 4" descr="QuizAnswer"/>
           <p:cNvSpPr/>
           <p:nvPr/>
         </p:nvSpPr>
@@ -18435,14 +18535,14 @@
       </p:grpSpPr>
       <p:graphicFrame>
         <p:nvGraphicFramePr>
-          <p:cNvPr id="10" name="Table 9"/>
+          <p:cNvPr id="10" name="Table 9" descr="QuizAnswer"/>
           <p:cNvGraphicFramePr>
             <a:graphicFrameLocks noGrp="1"/>
           </p:cNvGraphicFramePr>
           <p:nvPr>
             <p:extLst>
               <p:ext uri="{D42A27DB-BD31-4B8C-83A1-F6EECF244321}">
-                <p14:modId xmlns:p14="http://schemas.microsoft.com/office/powerpoint/2010/main" val="788871888"/>
+                <p14:modId xmlns:p14="http://schemas.microsoft.com/office/powerpoint/2010/main" val="2703133564"/>
               </p:ext>
             </p:extLst>
           </p:nvPr>
@@ -18935,7 +19035,7 @@
       </p:sp>
       <p:sp>
         <p:nvSpPr>
-          <p:cNvPr id="8" name="Smiley Face 7"/>
+          <p:cNvPr id="8" name="Smiley Face 7" descr="QuizAnswer"/>
           <p:cNvSpPr/>
           <p:nvPr/>
         </p:nvSpPr>
@@ -19037,7 +19137,7 @@
       </p:sp>
       <p:pic>
         <p:nvPicPr>
-          <p:cNvPr id="9" name="Picture 8"/>
+          <p:cNvPr id="9" name="Picture 8" descr="QuizAnswer"/>
           <p:cNvPicPr>
             <a:picLocks noChangeAspect="1"/>
           </p:cNvPicPr>
@@ -19067,7 +19167,7 @@
       </p:pic>
       <p:sp>
         <p:nvSpPr>
-          <p:cNvPr id="4" name="TextBox 3"/>
+          <p:cNvPr id="4" name="TextBox 3" descr="QuizAnswer"/>
           <p:cNvSpPr txBox="1"/>
           <p:nvPr/>
         </p:nvSpPr>
@@ -19972,7 +20072,7 @@
       </p:sp>
       <p:sp>
         <p:nvSpPr>
-          <p:cNvPr id="4" name="Smiley Face 3"/>
+          <p:cNvPr id="4" name="Smiley Face 3" descr="QuizAnswer"/>
           <p:cNvSpPr/>
           <p:nvPr/>
         </p:nvSpPr>
@@ -21825,7 +21925,7 @@
       </p:sp>
       <p:sp>
         <p:nvSpPr>
-          <p:cNvPr id="4" name="Smiley Face 3"/>
+          <p:cNvPr id="4" name="Smiley Face 3" descr="QuizAnswer"/>
           <p:cNvSpPr/>
           <p:nvPr/>
         </p:nvSpPr>
@@ -21876,14 +21976,14 @@
       </p:sp>
       <p:graphicFrame>
         <p:nvGraphicFramePr>
-          <p:cNvPr id="5" name="Table 4"/>
+          <p:cNvPr id="5" name="Table 4" descr="QuizAnswer"/>
           <p:cNvGraphicFramePr>
             <a:graphicFrameLocks noGrp="1"/>
           </p:cNvGraphicFramePr>
           <p:nvPr>
             <p:extLst>
               <p:ext uri="{D42A27DB-BD31-4B8C-83A1-F6EECF244321}">
-                <p14:modId xmlns:p14="http://schemas.microsoft.com/office/powerpoint/2010/main" val="4109105563"/>
+                <p14:modId xmlns:p14="http://schemas.microsoft.com/office/powerpoint/2010/main" val="2876980169"/>
               </p:ext>
             </p:extLst>
           </p:nvPr>
@@ -22211,7 +22311,7 @@
       </p:graphicFrame>
       <p:pic>
         <p:nvPicPr>
-          <p:cNvPr id="6" name="Picture 5"/>
+          <p:cNvPr id="6" name="Picture 5" descr="QuizAnswer"/>
           <p:cNvPicPr>
             <a:picLocks noChangeAspect="1"/>
           </p:cNvPicPr>
@@ -22241,7 +22341,7 @@
       </p:pic>
       <p:sp>
         <p:nvSpPr>
-          <p:cNvPr id="7" name="TextBox 6"/>
+          <p:cNvPr id="7" name="TextBox 6" descr="QuizAnswer"/>
           <p:cNvSpPr txBox="1"/>
           <p:nvPr/>
         </p:nvSpPr>

</xml_diff>

<commit_message>
all-slides-with-answers.pdf all-slides.pdf basics.pdf basics.pptx control.pdf control.pptx introduction.pdf introduction.pptx
</commit_message>
<xml_diff>
--- a/ipsa/slides/basics.pptx
+++ b/ipsa/slides/basics.pptx
@@ -135,277 +135,42 @@
 </p:presentation>
 </file>
 
+<file path=ppt/revisionInfo.xml><?xml version="1.0" encoding="utf-8"?>
+<p1510:revInfo xmlns:a="http://schemas.openxmlformats.org/drawingml/2006/main" xmlns:r="http://schemas.openxmlformats.org/officeDocument/2006/relationships" xmlns:p1510="http://schemas.microsoft.com/office/powerpoint/2015/10/main">
+  <p1510:revLst>
+    <p1510:client id="{5D9700D6-D51E-4F54-B323-5C08D6B7734D}" v="2" dt="2026-01-28T07:44:50.202"/>
+  </p1510:revLst>
+</p1510:revInfo>
+</file>
+
 <file path=ppt/changesInfos/changesInfo1.xml><?xml version="1.0" encoding="utf-8"?>
 <pc:chgInfo xmlns:a="http://schemas.openxmlformats.org/drawingml/2006/main" xmlns:r="http://schemas.openxmlformats.org/officeDocument/2006/relationships" xmlns:ac="http://schemas.microsoft.com/office/drawing/2013/main/command" xmlns:pc="http://schemas.microsoft.com/office/powerpoint/2013/main/command">
   <pc:docChgLst>
-    <pc:chgData name="Gerth Stølting Brodal" userId="04ef4784-6591-4f86-a140-f5c3b108582a" providerId="ADAL" clId="{2CF3E644-D673-41C4-B91E-2DD09D5FA5DD}"/>
+    <pc:chgData name="Gerth Stølting Brodal" userId="04ef4784-6591-4f86-a140-f5c3b108582a" providerId="ADAL" clId="{E3FB3D3F-03A2-4D0F-876D-930F74083705}"/>
     <pc:docChg chg="undo custSel modSld">
-      <pc:chgData name="Gerth Stølting Brodal" userId="04ef4784-6591-4f86-a140-f5c3b108582a" providerId="ADAL" clId="{2CF3E644-D673-41C4-B91E-2DD09D5FA5DD}" dt="2022-02-06T09:46:59.135" v="29" actId="1035"/>
+      <pc:chgData name="Gerth Stølting Brodal" userId="04ef4784-6591-4f86-a140-f5c3b108582a" providerId="ADAL" clId="{E3FB3D3F-03A2-4D0F-876D-930F74083705}" dt="2026-01-28T07:44:55.885" v="115" actId="113"/>
       <pc:docMkLst>
         <pc:docMk/>
       </pc:docMkLst>
-      <pc:sldChg chg="modSp mod">
-        <pc:chgData name="Gerth Stølting Brodal" userId="04ef4784-6591-4f86-a140-f5c3b108582a" providerId="ADAL" clId="{2CF3E644-D673-41C4-B91E-2DD09D5FA5DD}" dt="2022-01-29T16:19:31.947" v="7" actId="27636"/>
+      <pc:sldChg chg="modNotesTx">
+        <pc:chgData name="Gerth Stølting Brodal" userId="04ef4784-6591-4f86-a140-f5c3b108582a" providerId="ADAL" clId="{E3FB3D3F-03A2-4D0F-876D-930F74083705}" dt="2026-01-28T07:21:28.685" v="56" actId="20577"/>
         <pc:sldMkLst>
           <pc:docMk/>
-          <pc:sldMk cId="81647366" sldId="347"/>
+          <pc:sldMk cId="48303750" sldId="357"/>
         </pc:sldMkLst>
       </pc:sldChg>
-      <pc:sldChg chg="modSp mod">
-        <pc:chgData name="Gerth Stølting Brodal" userId="04ef4784-6591-4f86-a140-f5c3b108582a" providerId="ADAL" clId="{2CF3E644-D673-41C4-B91E-2DD09D5FA5DD}" dt="2022-02-06T09:46:59.135" v="29" actId="1035"/>
-        <pc:sldMkLst>
-          <pc:docMk/>
-          <pc:sldMk cId="1252763104" sldId="358"/>
-        </pc:sldMkLst>
-      </pc:sldChg>
-      <pc:sldChg chg="modSp modAnim">
-        <pc:chgData name="Gerth Stølting Brodal" userId="04ef4784-6591-4f86-a140-f5c3b108582a" providerId="ADAL" clId="{2CF3E644-D673-41C4-B91E-2DD09D5FA5DD}" dt="2022-01-29T16:19:58.858" v="27" actId="20577"/>
+      <pc:sldChg chg="modNotesTx">
+        <pc:chgData name="Gerth Stølting Brodal" userId="04ef4784-6591-4f86-a140-f5c3b108582a" providerId="ADAL" clId="{E3FB3D3F-03A2-4D0F-876D-930F74083705}" dt="2026-01-28T07:27:12.900" v="101" actId="6549"/>
         <pc:sldMkLst>
           <pc:docMk/>
           <pc:sldMk cId="247088337" sldId="361"/>
         </pc:sldMkLst>
       </pc:sldChg>
-    </pc:docChg>
-  </pc:docChgLst>
-  <pc:docChgLst>
-    <pc:chgData name="Gerth Stølting Brodal" userId="04ef4784-6591-4f86-a140-f5c3b108582a" providerId="ADAL" clId="{19B2619F-AF11-406A-8620-690814C4F2A4}"/>
-    <pc:docChg chg="undo redo custSel modSld">
-      <pc:chgData name="Gerth Stølting Brodal" userId="04ef4784-6591-4f86-a140-f5c3b108582a" providerId="ADAL" clId="{19B2619F-AF11-406A-8620-690814C4F2A4}" dt="2025-02-03T12:10:14.731" v="298" actId="1035"/>
-      <pc:docMkLst>
-        <pc:docMk/>
-      </pc:docMkLst>
-      <pc:sldChg chg="modSp mod">
-        <pc:chgData name="Gerth Stølting Brodal" userId="04ef4784-6591-4f86-a140-f5c3b108582a" providerId="ADAL" clId="{19B2619F-AF11-406A-8620-690814C4F2A4}" dt="2025-01-30T08:57:37.226" v="94" actId="20577"/>
-        <pc:sldMkLst>
-          <pc:docMk/>
-          <pc:sldMk cId="48303750" sldId="357"/>
-        </pc:sldMkLst>
-      </pc:sldChg>
-      <pc:sldChg chg="modSp mod">
-        <pc:chgData name="Gerth Stølting Brodal" userId="04ef4784-6591-4f86-a140-f5c3b108582a" providerId="ADAL" clId="{19B2619F-AF11-406A-8620-690814C4F2A4}" dt="2025-02-03T12:10:14.731" v="298" actId="1035"/>
-        <pc:sldMkLst>
-          <pc:docMk/>
-          <pc:sldMk cId="3240216432" sldId="390"/>
-        </pc:sldMkLst>
-      </pc:sldChg>
-    </pc:docChg>
-  </pc:docChgLst>
-  <pc:docChgLst>
-    <pc:chgData name="Gerth Stølting Brodal" userId="04ef4784-6591-4f86-a140-f5c3b108582a" providerId="ADAL" clId="{27124F44-A0F7-408A-AA2B-2C5136C1DC06}"/>
-    <pc:docChg chg="undo custSel modSld">
-      <pc:chgData name="Gerth Stølting Brodal" userId="04ef4784-6591-4f86-a140-f5c3b108582a" providerId="ADAL" clId="{27124F44-A0F7-408A-AA2B-2C5136C1DC06}" dt="2025-10-27T18:12:08.875" v="71" actId="962"/>
-      <pc:docMkLst>
-        <pc:docMk/>
-      </pc:docMkLst>
-      <pc:sldChg chg="modSp mod">
-        <pc:chgData name="Gerth Stølting Brodal" userId="04ef4784-6591-4f86-a140-f5c3b108582a" providerId="ADAL" clId="{27124F44-A0F7-408A-AA2B-2C5136C1DC06}" dt="2025-10-27T18:11:13.644" v="57" actId="962"/>
-        <pc:sldMkLst>
-          <pc:docMk/>
-          <pc:sldMk cId="1252763104" sldId="358"/>
-        </pc:sldMkLst>
-        <pc:spChg chg="mod">
-          <ac:chgData name="Gerth Stølting Brodal" userId="04ef4784-6591-4f86-a140-f5c3b108582a" providerId="ADAL" clId="{27124F44-A0F7-408A-AA2B-2C5136C1DC06}" dt="2025-10-27T18:11:13.644" v="57" actId="962"/>
-          <ac:spMkLst>
-            <pc:docMk/>
-            <pc:sldMk cId="1252763104" sldId="358"/>
-            <ac:spMk id="4" creationId="{00000000-0000-0000-0000-000000000000}"/>
-          </ac:spMkLst>
-        </pc:spChg>
-        <pc:spChg chg="mod">
-          <ac:chgData name="Gerth Stølting Brodal" userId="04ef4784-6591-4f86-a140-f5c3b108582a" providerId="ADAL" clId="{27124F44-A0F7-408A-AA2B-2C5136C1DC06}" dt="2025-10-27T18:10:42.397" v="23" actId="962"/>
-          <ac:spMkLst>
-            <pc:docMk/>
-            <pc:sldMk cId="1252763104" sldId="358"/>
-            <ac:spMk id="8" creationId="{00000000-0000-0000-0000-000000000000}"/>
-          </ac:spMkLst>
-        </pc:spChg>
-        <pc:graphicFrameChg chg="mod">
-          <ac:chgData name="Gerth Stølting Brodal" userId="04ef4784-6591-4f86-a140-f5c3b108582a" providerId="ADAL" clId="{27124F44-A0F7-408A-AA2B-2C5136C1DC06}" dt="2025-10-27T18:11:05.569" v="51" actId="962"/>
-          <ac:graphicFrameMkLst>
-            <pc:docMk/>
-            <pc:sldMk cId="1252763104" sldId="358"/>
-            <ac:graphicFrameMk id="10" creationId="{00000000-0000-0000-0000-000000000000}"/>
-          </ac:graphicFrameMkLst>
-        </pc:graphicFrameChg>
-        <pc:picChg chg="mod">
-          <ac:chgData name="Gerth Stølting Brodal" userId="04ef4784-6591-4f86-a140-f5c3b108582a" providerId="ADAL" clId="{27124F44-A0F7-408A-AA2B-2C5136C1DC06}" dt="2025-10-27T18:11:09.952" v="55" actId="962"/>
-          <ac:picMkLst>
-            <pc:docMk/>
-            <pc:sldMk cId="1252763104" sldId="358"/>
-            <ac:picMk id="9" creationId="{00000000-0000-0000-0000-000000000000}"/>
-          </ac:picMkLst>
-        </pc:picChg>
-      </pc:sldChg>
-      <pc:sldChg chg="modSp mod">
-        <pc:chgData name="Gerth Stølting Brodal" userId="04ef4784-6591-4f86-a140-f5c3b108582a" providerId="ADAL" clId="{27124F44-A0F7-408A-AA2B-2C5136C1DC06}" dt="2025-10-27T18:11:33.021" v="59" actId="962"/>
-        <pc:sldMkLst>
-          <pc:docMk/>
-          <pc:sldMk cId="1651364254" sldId="364"/>
-        </pc:sldMkLst>
-        <pc:spChg chg="mod">
-          <ac:chgData name="Gerth Stølting Brodal" userId="04ef4784-6591-4f86-a140-f5c3b108582a" providerId="ADAL" clId="{27124F44-A0F7-408A-AA2B-2C5136C1DC06}" dt="2025-10-27T18:11:33.021" v="59" actId="962"/>
-          <ac:spMkLst>
-            <pc:docMk/>
-            <pc:sldMk cId="1651364254" sldId="364"/>
-            <ac:spMk id="4" creationId="{00000000-0000-0000-0000-000000000000}"/>
-          </ac:spMkLst>
-        </pc:spChg>
-      </pc:sldChg>
-      <pc:sldChg chg="modSp mod">
-        <pc:chgData name="Gerth Stølting Brodal" userId="04ef4784-6591-4f86-a140-f5c3b108582a" providerId="ADAL" clId="{27124F44-A0F7-408A-AA2B-2C5136C1DC06}" dt="2025-10-27T18:11:51.980" v="67" actId="962"/>
-        <pc:sldMkLst>
-          <pc:docMk/>
-          <pc:sldMk cId="3279644778" sldId="366"/>
-        </pc:sldMkLst>
-        <pc:spChg chg="mod">
-          <ac:chgData name="Gerth Stølting Brodal" userId="04ef4784-6591-4f86-a140-f5c3b108582a" providerId="ADAL" clId="{27124F44-A0F7-408A-AA2B-2C5136C1DC06}" dt="2025-10-27T18:11:43.176" v="61" actId="962"/>
-          <ac:spMkLst>
-            <pc:docMk/>
-            <pc:sldMk cId="3279644778" sldId="366"/>
-            <ac:spMk id="4" creationId="{00000000-0000-0000-0000-000000000000}"/>
-          </ac:spMkLst>
-        </pc:spChg>
-        <pc:spChg chg="mod">
-          <ac:chgData name="Gerth Stølting Brodal" userId="04ef4784-6591-4f86-a140-f5c3b108582a" providerId="ADAL" clId="{27124F44-A0F7-408A-AA2B-2C5136C1DC06}" dt="2025-10-27T18:11:51.980" v="67" actId="962"/>
-          <ac:spMkLst>
-            <pc:docMk/>
-            <pc:sldMk cId="3279644778" sldId="366"/>
-            <ac:spMk id="7" creationId="{00000000-0000-0000-0000-000000000000}"/>
-          </ac:spMkLst>
-        </pc:spChg>
-        <pc:graphicFrameChg chg="mod">
-          <ac:chgData name="Gerth Stølting Brodal" userId="04ef4784-6591-4f86-a140-f5c3b108582a" providerId="ADAL" clId="{27124F44-A0F7-408A-AA2B-2C5136C1DC06}" dt="2025-10-27T18:11:49.335" v="65" actId="962"/>
-          <ac:graphicFrameMkLst>
-            <pc:docMk/>
-            <pc:sldMk cId="3279644778" sldId="366"/>
-            <ac:graphicFrameMk id="5" creationId="{00000000-0000-0000-0000-000000000000}"/>
-          </ac:graphicFrameMkLst>
-        </pc:graphicFrameChg>
-        <pc:picChg chg="mod">
-          <ac:chgData name="Gerth Stølting Brodal" userId="04ef4784-6591-4f86-a140-f5c3b108582a" providerId="ADAL" clId="{27124F44-A0F7-408A-AA2B-2C5136C1DC06}" dt="2025-10-27T18:11:46.224" v="63" actId="962"/>
-          <ac:picMkLst>
-            <pc:docMk/>
-            <pc:sldMk cId="3279644778" sldId="366"/>
-            <ac:picMk id="6" creationId="{00000000-0000-0000-0000-000000000000}"/>
-          </ac:picMkLst>
-        </pc:picChg>
-      </pc:sldChg>
-      <pc:sldChg chg="modSp mod">
-        <pc:chgData name="Gerth Stølting Brodal" userId="04ef4784-6591-4f86-a140-f5c3b108582a" providerId="ADAL" clId="{27124F44-A0F7-408A-AA2B-2C5136C1DC06}" dt="2025-10-27T18:12:00.161" v="69" actId="962"/>
-        <pc:sldMkLst>
-          <pc:docMk/>
-          <pc:sldMk cId="2955211567" sldId="369"/>
-        </pc:sldMkLst>
-        <pc:spChg chg="mod">
-          <ac:chgData name="Gerth Stølting Brodal" userId="04ef4784-6591-4f86-a140-f5c3b108582a" providerId="ADAL" clId="{27124F44-A0F7-408A-AA2B-2C5136C1DC06}" dt="2025-10-27T18:12:00.161" v="69" actId="962"/>
-          <ac:spMkLst>
-            <pc:docMk/>
-            <pc:sldMk cId="2955211567" sldId="369"/>
-            <ac:spMk id="4" creationId="{00000000-0000-0000-0000-000000000000}"/>
-          </ac:spMkLst>
-        </pc:spChg>
-      </pc:sldChg>
-      <pc:sldChg chg="modSp mod">
-        <pc:chgData name="Gerth Stølting Brodal" userId="04ef4784-6591-4f86-a140-f5c3b108582a" providerId="ADAL" clId="{27124F44-A0F7-408A-AA2B-2C5136C1DC06}" dt="2025-10-27T18:12:08.875" v="71" actId="962"/>
-        <pc:sldMkLst>
-          <pc:docMk/>
-          <pc:sldMk cId="4156421730" sldId="387"/>
-        </pc:sldMkLst>
-        <pc:spChg chg="mod">
-          <ac:chgData name="Gerth Stølting Brodal" userId="04ef4784-6591-4f86-a140-f5c3b108582a" providerId="ADAL" clId="{27124F44-A0F7-408A-AA2B-2C5136C1DC06}" dt="2025-10-27T18:12:08.875" v="71" actId="962"/>
-          <ac:spMkLst>
-            <pc:docMk/>
-            <pc:sldMk cId="4156421730" sldId="387"/>
-            <ac:spMk id="5" creationId="{00000000-0000-0000-0000-000000000000}"/>
-          </ac:spMkLst>
-        </pc:spChg>
-      </pc:sldChg>
-    </pc:docChg>
-  </pc:docChgLst>
-  <pc:docChgLst>
-    <pc:chgData name="Gerth Stølting Brodal" userId="04ef4784-6591-4f86-a140-f5c3b108582a" providerId="ADAL" clId="{32101DF0-6FF6-4597-A180-68523FCC3A71}"/>
-    <pc:docChg chg="undo redo custSel addSld delSld modSld">
-      <pc:chgData name="Gerth Stølting Brodal" userId="04ef4784-6591-4f86-a140-f5c3b108582a" providerId="ADAL" clId="{32101DF0-6FF6-4597-A180-68523FCC3A71}" dt="2024-02-12T06:59:00.840" v="932" actId="1038"/>
-      <pc:docMkLst>
-        <pc:docMk/>
-      </pc:docMkLst>
-      <pc:sldChg chg="modSp">
-        <pc:chgData name="Gerth Stølting Brodal" userId="04ef4784-6591-4f86-a140-f5c3b108582a" providerId="ADAL" clId="{32101DF0-6FF6-4597-A180-68523FCC3A71}" dt="2024-01-30T12:09:10.468" v="473" actId="2711"/>
-        <pc:sldMkLst>
-          <pc:docMk/>
-          <pc:sldMk cId="764548202" sldId="260"/>
-        </pc:sldMkLst>
-      </pc:sldChg>
-      <pc:sldChg chg="modSp mod">
-        <pc:chgData name="Gerth Stølting Brodal" userId="04ef4784-6591-4f86-a140-f5c3b108582a" providerId="ADAL" clId="{32101DF0-6FF6-4597-A180-68523FCC3A71}" dt="2024-01-30T11:21:18.032" v="103" actId="20577"/>
-        <pc:sldMkLst>
-          <pc:docMk/>
-          <pc:sldMk cId="2622067556" sldId="289"/>
-        </pc:sldMkLst>
-      </pc:sldChg>
-      <pc:sldChg chg="addSp modSp mod modNotesTx">
-        <pc:chgData name="Gerth Stølting Brodal" userId="04ef4784-6591-4f86-a140-f5c3b108582a" providerId="ADAL" clId="{32101DF0-6FF6-4597-A180-68523FCC3A71}" dt="2024-01-30T11:43:33.271" v="471" actId="20577"/>
-        <pc:sldMkLst>
-          <pc:docMk/>
-          <pc:sldMk cId="81647366" sldId="347"/>
-        </pc:sldMkLst>
-      </pc:sldChg>
-      <pc:sldChg chg="addSp delSp modSp mod">
-        <pc:chgData name="Gerth Stølting Brodal" userId="04ef4784-6591-4f86-a140-f5c3b108582a" providerId="ADAL" clId="{32101DF0-6FF6-4597-A180-68523FCC3A71}" dt="2024-02-12T06:59:00.840" v="932" actId="1038"/>
-        <pc:sldMkLst>
-          <pc:docMk/>
-          <pc:sldMk cId="3514810135" sldId="348"/>
-        </pc:sldMkLst>
-      </pc:sldChg>
-      <pc:sldChg chg="modSp mod">
-        <pc:chgData name="Gerth Stølting Brodal" userId="04ef4784-6591-4f86-a140-f5c3b108582a" providerId="ADAL" clId="{32101DF0-6FF6-4597-A180-68523FCC3A71}" dt="2024-02-05T07:22:49.893" v="614" actId="20577"/>
-        <pc:sldMkLst>
-          <pc:docMk/>
-          <pc:sldMk cId="2228799271" sldId="349"/>
-        </pc:sldMkLst>
-      </pc:sldChg>
       <pc:sldChg chg="modNotesTx">
-        <pc:chgData name="Gerth Stølting Brodal" userId="04ef4784-6591-4f86-a140-f5c3b108582a" providerId="ADAL" clId="{32101DF0-6FF6-4597-A180-68523FCC3A71}" dt="2024-02-05T07:27:43.505" v="786" actId="20577"/>
-        <pc:sldMkLst>
-          <pc:docMk/>
-          <pc:sldMk cId="1231819641" sldId="360"/>
-        </pc:sldMkLst>
-      </pc:sldChg>
-      <pc:sldChg chg="modSp mod modNotesTx">
-        <pc:chgData name="Gerth Stølting Brodal" userId="04ef4784-6591-4f86-a140-f5c3b108582a" providerId="ADAL" clId="{32101DF0-6FF6-4597-A180-68523FCC3A71}" dt="2024-02-05T07:30:58.038" v="789" actId="1076"/>
-        <pc:sldMkLst>
-          <pc:docMk/>
-          <pc:sldMk cId="937047488" sldId="373"/>
-        </pc:sldMkLst>
-      </pc:sldChg>
-      <pc:sldChg chg="modSp mod">
-        <pc:chgData name="Gerth Stølting Brodal" userId="04ef4784-6591-4f86-a140-f5c3b108582a" providerId="ADAL" clId="{32101DF0-6FF6-4597-A180-68523FCC3A71}" dt="2024-01-30T12:04:09.394" v="472" actId="20577"/>
+        <pc:chgData name="Gerth Stølting Brodal" userId="04ef4784-6591-4f86-a140-f5c3b108582a" providerId="ADAL" clId="{E3FB3D3F-03A2-4D0F-876D-930F74083705}" dt="2026-01-28T07:44:55.885" v="115" actId="113"/>
         <pc:sldMkLst>
           <pc:docMk/>
           <pc:sldMk cId="1315690994" sldId="389"/>
-        </pc:sldMkLst>
-      </pc:sldChg>
-      <pc:sldChg chg="new del">
-        <pc:chgData name="Gerth Stølting Brodal" userId="04ef4784-6591-4f86-a140-f5c3b108582a" providerId="ADAL" clId="{32101DF0-6FF6-4597-A180-68523FCC3A71}" dt="2024-01-30T11:30:43.692" v="142" actId="680"/>
-        <pc:sldMkLst>
-          <pc:docMk/>
-          <pc:sldMk cId="180077174" sldId="392"/>
-        </pc:sldMkLst>
-      </pc:sldChg>
-    </pc:docChg>
-  </pc:docChgLst>
-  <pc:docChgLst>
-    <pc:chgData name="Gerth Stølting Brodal" userId="04ef4784-6591-4f86-a140-f5c3b108582a" providerId="ADAL" clId="{4A80E814-F313-4486-8FBC-BCA831690269}"/>
-    <pc:docChg chg="modSld">
-      <pc:chgData name="Gerth Stølting Brodal" userId="04ef4784-6591-4f86-a140-f5c3b108582a" providerId="ADAL" clId="{4A80E814-F313-4486-8FBC-BCA831690269}" dt="2023-01-26T18:14:18.365" v="197" actId="20577"/>
-      <pc:docMkLst>
-        <pc:docMk/>
-      </pc:docMkLst>
-      <pc:sldChg chg="modNotesTx">
-        <pc:chgData name="Gerth Stølting Brodal" userId="04ef4784-6591-4f86-a140-f5c3b108582a" providerId="ADAL" clId="{4A80E814-F313-4486-8FBC-BCA831690269}" dt="2023-01-26T18:14:18.365" v="197" actId="20577"/>
-        <pc:sldMkLst>
-          <pc:docMk/>
-          <pc:sldMk cId="48303750" sldId="357"/>
         </pc:sldMkLst>
       </pc:sldChg>
     </pc:docChg>
@@ -495,7 +260,7 @@
           <a:p>
             <a:fld id="{FB1A172F-81D4-4DC4-9113-1DBD56EC3646}" type="datetimeFigureOut">
               <a:rPr lang="en-US" smtClean="0"/>
-              <a:t>10/27/2025</a:t>
+              <a:t>1/28/2026</a:t>
             </a:fld>
             <a:endParaRPr lang="en-US"/>
           </a:p>
@@ -1288,6 +1053,40 @@
           <a:bodyPr/>
           <a:lstStyle/>
           <a:p>
+            <a:pPr marL="0" marR="0" lvl="0" indent="0" algn="l" defTabSz="914400" rtl="0" eaLnBrk="1" fontAlgn="auto" latinLnBrk="0" hangingPunct="1">
+              <a:lnSpc>
+                <a:spcPct val="100000"/>
+              </a:lnSpc>
+              <a:spcBef>
+                <a:spcPts val="0"/>
+              </a:spcBef>
+              <a:spcAft>
+                <a:spcPts val="0"/>
+              </a:spcAft>
+              <a:buClrTx/>
+              <a:buSzTx/>
+              <a:buFontTx/>
+              <a:buNone/>
+              <a:tabLst/>
+              <a:defRPr/>
+            </a:pPr>
+            <a:r>
+              <a:rPr lang="en-US" dirty="0"/>
+              <a:t>PEP8: “</a:t>
+            </a:r>
+            <a:r>
+              <a:rPr lang="en-US" b="1" dirty="0"/>
+              <a:t>Limit all lines to a maximum of 79 characters.</a:t>
+            </a:r>
+            <a:r>
+              <a:rPr lang="en-US" dirty="0"/>
+              <a:t>”</a:t>
+            </a:r>
+          </a:p>
+          <a:p>
+            <a:endParaRPr lang="en-US" dirty="0"/>
+          </a:p>
+          <a:p>
             <a:r>
               <a:rPr lang="en-US" dirty="0"/>
               <a:t>the</a:t>
@@ -2274,13 +2073,30 @@
             </a:r>
             <a:r>
               <a:rPr lang="en-US" dirty="0"/>
-              <a:t>(0) allows an arbitrary number of digits to </a:t>
-            </a:r>
-            <a:r>
-              <a:rPr lang="en-US"/>
-              <a:t>be printed</a:t>
-            </a:r>
-            <a:endParaRPr lang="en-US" dirty="0"/>
+              <a:t>(0) allows an arbitrary number of digits to be printed</a:t>
+            </a:r>
+          </a:p>
+          <a:p>
+            <a:r>
+              <a:rPr lang="en-US" dirty="0"/>
+              <a:t>--7 is </a:t>
+            </a:r>
+            <a:r>
+              <a:rPr lang="en-US" dirty="0" err="1"/>
+              <a:t>is</a:t>
+            </a:r>
+            <a:r>
+              <a:rPr lang="en-US" dirty="0"/>
+              <a:t> </a:t>
+            </a:r>
+            <a:r>
+              <a:rPr lang="en-US" dirty="0" err="1"/>
+              <a:t>infact</a:t>
+            </a:r>
+            <a:r>
+              <a:rPr lang="en-US" dirty="0"/>
+              <a:t> -7 negated, i.e., (-7).__neg__()</a:t>
+            </a:r>
           </a:p>
         </p:txBody>
       </p:sp>
@@ -2812,7 +2628,7 @@
           <a:p>
             <a:fld id="{0560A9CD-0304-4E0B-9E82-E7E0115DE05B}" type="datetimeFigureOut">
               <a:rPr lang="en-US" smtClean="0"/>
-              <a:t>10/27/2025</a:t>
+              <a:t>1/28/2026</a:t>
             </a:fld>
             <a:endParaRPr lang="en-US"/>
           </a:p>
@@ -2980,7 +2796,7 @@
           <a:p>
             <a:fld id="{0560A9CD-0304-4E0B-9E82-E7E0115DE05B}" type="datetimeFigureOut">
               <a:rPr lang="en-US" smtClean="0"/>
-              <a:t>10/27/2025</a:t>
+              <a:t>1/28/2026</a:t>
             </a:fld>
             <a:endParaRPr lang="en-US"/>
           </a:p>
@@ -3158,7 +2974,7 @@
           <a:p>
             <a:fld id="{0560A9CD-0304-4E0B-9E82-E7E0115DE05B}" type="datetimeFigureOut">
               <a:rPr lang="en-US" smtClean="0"/>
-              <a:t>10/27/2025</a:t>
+              <a:t>1/28/2026</a:t>
             </a:fld>
             <a:endParaRPr lang="en-US"/>
           </a:p>
@@ -3335,7 +3151,7 @@
           <a:p>
             <a:fld id="{0560A9CD-0304-4E0B-9E82-E7E0115DE05B}" type="datetimeFigureOut">
               <a:rPr lang="en-US" smtClean="0"/>
-              <a:t>10/27/2025</a:t>
+              <a:t>1/28/2026</a:t>
             </a:fld>
             <a:endParaRPr lang="en-US"/>
           </a:p>
@@ -3580,7 +3396,7 @@
           <a:p>
             <a:fld id="{0560A9CD-0304-4E0B-9E82-E7E0115DE05B}" type="datetimeFigureOut">
               <a:rPr lang="en-US" smtClean="0"/>
-              <a:t>10/27/2025</a:t>
+              <a:t>1/28/2026</a:t>
             </a:fld>
             <a:endParaRPr lang="en-US"/>
           </a:p>
@@ -3809,7 +3625,7 @@
           <a:p>
             <a:fld id="{0560A9CD-0304-4E0B-9E82-E7E0115DE05B}" type="datetimeFigureOut">
               <a:rPr lang="en-US" smtClean="0"/>
-              <a:t>10/27/2025</a:t>
+              <a:t>1/28/2026</a:t>
             </a:fld>
             <a:endParaRPr lang="en-US"/>
           </a:p>
@@ -4173,7 +3989,7 @@
           <a:p>
             <a:fld id="{0560A9CD-0304-4E0B-9E82-E7E0115DE05B}" type="datetimeFigureOut">
               <a:rPr lang="en-US" smtClean="0"/>
-              <a:t>10/27/2025</a:t>
+              <a:t>1/28/2026</a:t>
             </a:fld>
             <a:endParaRPr lang="en-US"/>
           </a:p>
@@ -4290,7 +4106,7 @@
           <a:p>
             <a:fld id="{0560A9CD-0304-4E0B-9E82-E7E0115DE05B}" type="datetimeFigureOut">
               <a:rPr lang="en-US" smtClean="0"/>
-              <a:t>10/27/2025</a:t>
+              <a:t>1/28/2026</a:t>
             </a:fld>
             <a:endParaRPr lang="en-US"/>
           </a:p>
@@ -4385,7 +4201,7 @@
           <a:p>
             <a:fld id="{0560A9CD-0304-4E0B-9E82-E7E0115DE05B}" type="datetimeFigureOut">
               <a:rPr lang="en-US" smtClean="0"/>
-              <a:t>10/27/2025</a:t>
+              <a:t>1/28/2026</a:t>
             </a:fld>
             <a:endParaRPr lang="en-US"/>
           </a:p>
@@ -4660,7 +4476,7 @@
           <a:p>
             <a:fld id="{0560A9CD-0304-4E0B-9E82-E7E0115DE05B}" type="datetimeFigureOut">
               <a:rPr lang="en-US" smtClean="0"/>
-              <a:t>10/27/2025</a:t>
+              <a:t>1/28/2026</a:t>
             </a:fld>
             <a:endParaRPr lang="en-US"/>
           </a:p>
@@ -4912,7 +4728,7 @@
           <a:p>
             <a:fld id="{0560A9CD-0304-4E0B-9E82-E7E0115DE05B}" type="datetimeFigureOut">
               <a:rPr lang="en-US" smtClean="0"/>
-              <a:t>10/27/2025</a:t>
+              <a:t>1/28/2026</a:t>
             </a:fld>
             <a:endParaRPr lang="en-US"/>
           </a:p>
@@ -5123,7 +4939,7 @@
           <a:p>
             <a:fld id="{0560A9CD-0304-4E0B-9E82-E7E0115DE05B}" type="datetimeFigureOut">
               <a:rPr lang="en-US" smtClean="0"/>
-              <a:t>10/27/2025</a:t>
+              <a:t>1/28/2026</a:t>
             </a:fld>
             <a:endParaRPr lang="en-US"/>
           </a:p>

</xml_diff>

<commit_message>
exercises.html all-slides-with-answers.pdf all-slides.pdf basics.pdf basics.pptx control.pdf control.pptx generator.pdf generator.pptx introduction.pdf introduction.pptx operations.pdf operations.pptx tuple.pdf tuple.pptx
</commit_message>
<xml_diff>
--- a/ipsa/slides/basics.pptx
+++ b/ipsa/slides/basics.pptx
@@ -148,16 +148,24 @@
   <pc:docChgLst>
     <pc:chgData name="Gerth Stølting Brodal" userId="04ef4784-6591-4f86-a140-f5c3b108582a" providerId="ADAL" clId="{E3FB3D3F-03A2-4D0F-876D-930F74083705}"/>
     <pc:docChg chg="undo custSel modSld">
-      <pc:chgData name="Gerth Stølting Brodal" userId="04ef4784-6591-4f86-a140-f5c3b108582a" providerId="ADAL" clId="{E3FB3D3F-03A2-4D0F-876D-930F74083705}" dt="2026-01-28T07:44:55.885" v="115" actId="113"/>
+      <pc:chgData name="Gerth Stølting Brodal" userId="04ef4784-6591-4f86-a140-f5c3b108582a" providerId="ADAL" clId="{E3FB3D3F-03A2-4D0F-876D-930F74083705}" dt="2026-02-01T20:50:38.909" v="116" actId="20577"/>
       <pc:docMkLst>
         <pc:docMk/>
       </pc:docMkLst>
-      <pc:sldChg chg="modNotesTx">
-        <pc:chgData name="Gerth Stølting Brodal" userId="04ef4784-6591-4f86-a140-f5c3b108582a" providerId="ADAL" clId="{E3FB3D3F-03A2-4D0F-876D-930F74083705}" dt="2026-01-28T07:21:28.685" v="56" actId="20577"/>
+      <pc:sldChg chg="modSp mod modNotesTx">
+        <pc:chgData name="Gerth Stølting Brodal" userId="04ef4784-6591-4f86-a140-f5c3b108582a" providerId="ADAL" clId="{E3FB3D3F-03A2-4D0F-876D-930F74083705}" dt="2026-02-01T20:50:38.909" v="116" actId="20577"/>
         <pc:sldMkLst>
           <pc:docMk/>
           <pc:sldMk cId="48303750" sldId="357"/>
         </pc:sldMkLst>
+        <pc:spChg chg="mod">
+          <ac:chgData name="Gerth Stølting Brodal" userId="04ef4784-6591-4f86-a140-f5c3b108582a" providerId="ADAL" clId="{E3FB3D3F-03A2-4D0F-876D-930F74083705}" dt="2026-02-01T20:50:38.909" v="116" actId="20577"/>
+          <ac:spMkLst>
+            <pc:docMk/>
+            <pc:sldMk cId="48303750" sldId="357"/>
+            <ac:spMk id="3" creationId="{00000000-0000-0000-0000-000000000000}"/>
+          </ac:spMkLst>
+        </pc:spChg>
       </pc:sldChg>
       <pc:sldChg chg="modNotesTx">
         <pc:chgData name="Gerth Stølting Brodal" userId="04ef4784-6591-4f86-a140-f5c3b108582a" providerId="ADAL" clId="{E3FB3D3F-03A2-4D0F-876D-930F74083705}" dt="2026-01-28T07:27:12.900" v="101" actId="6549"/>
@@ -260,7 +268,7 @@
           <a:p>
             <a:fld id="{FB1A172F-81D4-4DC4-9113-1DBD56EC3646}" type="datetimeFigureOut">
               <a:rPr lang="en-US" smtClean="0"/>
-              <a:t>1/28/2026</a:t>
+              <a:t>2/1/2026</a:t>
             </a:fld>
             <a:endParaRPr lang="en-US"/>
           </a:p>
@@ -2628,7 +2636,7 @@
           <a:p>
             <a:fld id="{0560A9CD-0304-4E0B-9E82-E7E0115DE05B}" type="datetimeFigureOut">
               <a:rPr lang="en-US" smtClean="0"/>
-              <a:t>1/28/2026</a:t>
+              <a:t>2/1/2026</a:t>
             </a:fld>
             <a:endParaRPr lang="en-US"/>
           </a:p>
@@ -2796,7 +2804,7 @@
           <a:p>
             <a:fld id="{0560A9CD-0304-4E0B-9E82-E7E0115DE05B}" type="datetimeFigureOut">
               <a:rPr lang="en-US" smtClean="0"/>
-              <a:t>1/28/2026</a:t>
+              <a:t>2/1/2026</a:t>
             </a:fld>
             <a:endParaRPr lang="en-US"/>
           </a:p>
@@ -2974,7 +2982,7 @@
           <a:p>
             <a:fld id="{0560A9CD-0304-4E0B-9E82-E7E0115DE05B}" type="datetimeFigureOut">
               <a:rPr lang="en-US" smtClean="0"/>
-              <a:t>1/28/2026</a:t>
+              <a:t>2/1/2026</a:t>
             </a:fld>
             <a:endParaRPr lang="en-US"/>
           </a:p>
@@ -3151,7 +3159,7 @@
           <a:p>
             <a:fld id="{0560A9CD-0304-4E0B-9E82-E7E0115DE05B}" type="datetimeFigureOut">
               <a:rPr lang="en-US" smtClean="0"/>
-              <a:t>1/28/2026</a:t>
+              <a:t>2/1/2026</a:t>
             </a:fld>
             <a:endParaRPr lang="en-US"/>
           </a:p>
@@ -3396,7 +3404,7 @@
           <a:p>
             <a:fld id="{0560A9CD-0304-4E0B-9E82-E7E0115DE05B}" type="datetimeFigureOut">
               <a:rPr lang="en-US" smtClean="0"/>
-              <a:t>1/28/2026</a:t>
+              <a:t>2/1/2026</a:t>
             </a:fld>
             <a:endParaRPr lang="en-US"/>
           </a:p>
@@ -3625,7 +3633,7 @@
           <a:p>
             <a:fld id="{0560A9CD-0304-4E0B-9E82-E7E0115DE05B}" type="datetimeFigureOut">
               <a:rPr lang="en-US" smtClean="0"/>
-              <a:t>1/28/2026</a:t>
+              <a:t>2/1/2026</a:t>
             </a:fld>
             <a:endParaRPr lang="en-US"/>
           </a:p>
@@ -3989,7 +3997,7 @@
           <a:p>
             <a:fld id="{0560A9CD-0304-4E0B-9E82-E7E0115DE05B}" type="datetimeFigureOut">
               <a:rPr lang="en-US" smtClean="0"/>
-              <a:t>1/28/2026</a:t>
+              <a:t>2/1/2026</a:t>
             </a:fld>
             <a:endParaRPr lang="en-US"/>
           </a:p>
@@ -4106,7 +4114,7 @@
           <a:p>
             <a:fld id="{0560A9CD-0304-4E0B-9E82-E7E0115DE05B}" type="datetimeFigureOut">
               <a:rPr lang="en-US" smtClean="0"/>
-              <a:t>1/28/2026</a:t>
+              <a:t>2/1/2026</a:t>
             </a:fld>
             <a:endParaRPr lang="en-US"/>
           </a:p>
@@ -4201,7 +4209,7 @@
           <a:p>
             <a:fld id="{0560A9CD-0304-4E0B-9E82-E7E0115DE05B}" type="datetimeFigureOut">
               <a:rPr lang="en-US" smtClean="0"/>
-              <a:t>1/28/2026</a:t>
+              <a:t>2/1/2026</a:t>
             </a:fld>
             <a:endParaRPr lang="en-US"/>
           </a:p>
@@ -4476,7 +4484,7 @@
           <a:p>
             <a:fld id="{0560A9CD-0304-4E0B-9E82-E7E0115DE05B}" type="datetimeFigureOut">
               <a:rPr lang="en-US" smtClean="0"/>
-              <a:t>1/28/2026</a:t>
+              <a:t>2/1/2026</a:t>
             </a:fld>
             <a:endParaRPr lang="en-US"/>
           </a:p>
@@ -4728,7 +4736,7 @@
           <a:p>
             <a:fld id="{0560A9CD-0304-4E0B-9E82-E7E0115DE05B}" type="datetimeFigureOut">
               <a:rPr lang="en-US" smtClean="0"/>
-              <a:t>1/28/2026</a:t>
+              <a:t>2/1/2026</a:t>
             </a:fld>
             <a:endParaRPr lang="en-US"/>
           </a:p>
@@ -4939,7 +4947,7 @@
           <a:p>
             <a:fld id="{0560A9CD-0304-4E0B-9E82-E7E0115DE05B}" type="datetimeFigureOut">
               <a:rPr lang="en-US" smtClean="0"/>
-              <a:t>1/28/2026</a:t>
+              <a:t>2/1/2026</a:t>
             </a:fld>
             <a:endParaRPr lang="en-US"/>
           </a:p>
@@ -19590,23 +19598,7 @@
             </a:pPr>
             <a:r>
               <a:rPr lang="en-US" dirty="0"/>
-              <a:t>Leading zeros </a:t>
-            </a:r>
-            <a:r>
-              <a:rPr lang="en-US"/>
-              <a:t>are not </a:t>
-            </a:r>
-            <a:r>
-              <a:rPr lang="en-US" dirty="0"/>
-              <a:t>allowed (e.g., 7 </a:t>
-            </a:r>
-            <a:r>
-              <a:rPr lang="en-US"/>
-              <a:t>cannot be written </a:t>
-            </a:r>
-            <a:r>
-              <a:rPr lang="en-US" dirty="0"/>
-              <a:t>as 007)</a:t>
+              <a:t>Leading zeros are not allowed (e.g. 7 cannot be written as 007)</a:t>
             </a:r>
           </a:p>
           <a:p>
@@ -20233,10 +20225,13 @@
               <a:t>Extreme values (</a:t>
             </a:r>
             <a:r>
-              <a:rPr lang="en-US"/>
-              <a:t>CPython)</a:t>
-            </a:r>
-            <a:endParaRPr lang="en-US" dirty="0"/>
+              <a:rPr lang="en-US" dirty="0" err="1"/>
+              <a:t>CPython</a:t>
+            </a:r>
+            <a:r>
+              <a:rPr lang="en-US" dirty="0"/>
+              <a:t>)</a:t>
+            </a:r>
           </a:p>
           <a:p>
             <a:pPr lvl="1"/>

</xml_diff>